<commit_message>
renamed Graphical Engine to Graphics Engine in diagrams
</commit_message>
<xml_diff>
--- a/ApplicationDeveloperGuide/images/virtual-device.pptx
+++ b/ApplicationDeveloperGuide/images/virtual-device.pptx
@@ -239,7 +239,7 @@
               <a:rPr lang="fr-FR" smtClean="0">
                 <a:latin typeface="Calibri Regular" charset="0"/>
               </a:rPr>
-              <a:t>janvier 21</a:t>
+              <a:t>mars 21</a:t>
             </a:fld>
             <a:endParaRPr lang="en-US" dirty="0">
               <a:latin typeface="Calibri Regular" charset="0"/>
@@ -418,7 +418,7 @@
             <a:fld id="{79958FA1-9FE8-F149-AB4B-7DC9950B39E9}" type="datetime6">
               <a:rPr lang="fr-FR" smtClean="0"/>
               <a:pPr/>
-              <a:t>janvier 21</a:t>
+              <a:t>mars 21</a:t>
             </a:fld>
             <a:endParaRPr lang="en-US" dirty="0"/>
           </a:p>
@@ -6945,7 +6945,7 @@
         </p:nvSpPr>
         <p:spPr>
           <a:xfrm>
-            <a:off x="3726687" y="1609344"/>
+            <a:off x="2443171" y="1449953"/>
             <a:ext cx="7435852" cy="2229042"/>
           </a:xfrm>
           <a:prstGeom prst="roundRect">
@@ -7023,7 +7023,7 @@
         </p:nvSpPr>
         <p:spPr>
           <a:xfrm rot="10800000">
-            <a:off x="3877257" y="1605452"/>
+            <a:off x="2593741" y="1446061"/>
             <a:ext cx="7152452" cy="325226"/>
           </a:xfrm>
           <a:prstGeom prst="round2SameRect">
@@ -7082,7 +7082,7 @@
         </p:nvSpPr>
         <p:spPr>
           <a:xfrm>
-            <a:off x="5723060" y="1529428"/>
+            <a:off x="4439544" y="1370037"/>
             <a:ext cx="3459097" cy="306000"/>
           </a:xfrm>
           <a:prstGeom prst="roundRect">
@@ -7164,7 +7164,7 @@
         </p:nvSpPr>
         <p:spPr>
           <a:xfrm>
-            <a:off x="3833866" y="2006995"/>
+            <a:off x="2550350" y="1847604"/>
             <a:ext cx="7240441" cy="709939"/>
           </a:xfrm>
           <a:prstGeom prst="roundRect">
@@ -7248,7 +7248,7 @@
         </p:nvSpPr>
         <p:spPr>
           <a:xfrm>
-            <a:off x="3945794" y="2349022"/>
+            <a:off x="2662278" y="2189631"/>
             <a:ext cx="6994673" cy="289728"/>
           </a:xfrm>
           <a:prstGeom prst="roundRect">
@@ -7589,7 +7589,7 @@
         </p:nvSpPr>
         <p:spPr>
           <a:xfrm rot="16200000">
-            <a:off x="3625743" y="6249405"/>
+            <a:off x="2342227" y="6090014"/>
             <a:ext cx="229393" cy="209087"/>
           </a:xfrm>
           <a:prstGeom prst="arc">
@@ -7643,7 +7643,7 @@
         </p:nvSpPr>
         <p:spPr>
           <a:xfrm>
-            <a:off x="11038946" y="6254977"/>
+            <a:off x="9755430" y="6095586"/>
             <a:ext cx="224156" cy="213972"/>
           </a:xfrm>
           <a:prstGeom prst="arc">
@@ -7697,7 +7697,7 @@
         </p:nvSpPr>
         <p:spPr>
           <a:xfrm>
-            <a:off x="3726687" y="5787200"/>
+            <a:off x="2443171" y="5627809"/>
             <a:ext cx="7435852" cy="573319"/>
           </a:xfrm>
           <a:prstGeom prst="snip2SameRect">
@@ -7767,7 +7767,7 @@
         </p:nvSpPr>
         <p:spPr>
           <a:xfrm>
-            <a:off x="8407762" y="5932909"/>
+            <a:off x="7124246" y="5773518"/>
             <a:ext cx="900000" cy="306000"/>
           </a:xfrm>
           <a:prstGeom prst="roundRect">
@@ -7837,7 +7837,7 @@
         </p:nvSpPr>
         <p:spPr>
           <a:xfrm>
-            <a:off x="4941422" y="5932909"/>
+            <a:off x="3657906" y="5773518"/>
             <a:ext cx="900000" cy="306000"/>
           </a:xfrm>
           <a:prstGeom prst="roundRect">
@@ -7928,7 +7928,7 @@
         </p:nvSpPr>
         <p:spPr>
           <a:xfrm>
-            <a:off x="10399015" y="5930870"/>
+            <a:off x="9115499" y="5771479"/>
             <a:ext cx="595578" cy="308039"/>
           </a:xfrm>
           <a:prstGeom prst="roundRect">
@@ -8009,7 +8009,7 @@
         </p:nvSpPr>
         <p:spPr>
           <a:xfrm>
-            <a:off x="5937050" y="5932909"/>
+            <a:off x="4653534" y="5773518"/>
             <a:ext cx="900000" cy="306000"/>
           </a:xfrm>
           <a:prstGeom prst="roundRect">
@@ -8079,7 +8079,7 @@
         </p:nvSpPr>
         <p:spPr>
           <a:xfrm>
-            <a:off x="6714689" y="5527673"/>
+            <a:off x="5431173" y="5368282"/>
             <a:ext cx="1856244" cy="721545"/>
           </a:xfrm>
           <a:custGeom>
@@ -8998,7 +8998,7 @@
         </p:nvGrpSpPr>
         <p:grpSpPr>
           <a:xfrm>
-            <a:off x="6998455" y="5787721"/>
+            <a:off x="5714939" y="5628330"/>
             <a:ext cx="1283487" cy="383162"/>
             <a:chOff x="6421785" y="5373193"/>
             <a:chExt cx="1283487" cy="383162"/>
@@ -9188,7 +9188,7 @@
         </p:nvSpPr>
         <p:spPr>
           <a:xfrm>
-            <a:off x="9872456" y="6328481"/>
+            <a:off x="8588940" y="6169090"/>
             <a:ext cx="1263935" cy="213954"/>
           </a:xfrm>
           <a:prstGeom prst="rect">
@@ -9239,7 +9239,7 @@
         </p:nvSpPr>
         <p:spPr>
           <a:xfrm>
-            <a:off x="10192481" y="5542495"/>
+            <a:off x="8908965" y="5383104"/>
             <a:ext cx="943910" cy="213954"/>
           </a:xfrm>
           <a:prstGeom prst="rect">
@@ -9291,7 +9291,7 @@
         </p:nvSpPr>
         <p:spPr>
           <a:xfrm>
-            <a:off x="3833866" y="2791774"/>
+            <a:off x="2550350" y="2632383"/>
             <a:ext cx="7239239" cy="656619"/>
           </a:xfrm>
           <a:prstGeom prst="roundRect">
@@ -9400,7 +9400,7 @@
         </p:blipFill>
         <p:spPr>
           <a:xfrm>
-            <a:off x="6523656" y="3475661"/>
+            <a:off x="5240140" y="3316270"/>
             <a:ext cx="1982135" cy="334761"/>
           </a:xfrm>
           <a:prstGeom prst="rect">
@@ -9422,7 +9422,7 @@
         </p:nvSpPr>
         <p:spPr>
           <a:xfrm>
-            <a:off x="10399015" y="3092921"/>
+            <a:off x="9115499" y="2933530"/>
             <a:ext cx="412471" cy="289727"/>
           </a:xfrm>
           <a:prstGeom prst="roundRect">
@@ -9496,7 +9496,7 @@
         </p:nvSpPr>
         <p:spPr>
           <a:xfrm>
-            <a:off x="8407762" y="3092921"/>
+            <a:off x="7124246" y="2933530"/>
             <a:ext cx="900000" cy="289728"/>
           </a:xfrm>
           <a:prstGeom prst="roundRect">
@@ -9561,7 +9561,7 @@
         </p:nvSpPr>
         <p:spPr>
           <a:xfrm>
-            <a:off x="9403390" y="3092921"/>
+            <a:off x="8119874" y="2933530"/>
             <a:ext cx="900000" cy="289727"/>
           </a:xfrm>
           <a:prstGeom prst="roundRect">
@@ -9626,7 +9626,7 @@
         </p:nvSpPr>
         <p:spPr>
           <a:xfrm>
-            <a:off x="6938173" y="3092921"/>
+            <a:off x="5654657" y="2933530"/>
             <a:ext cx="633600" cy="289728"/>
           </a:xfrm>
           <a:prstGeom prst="roundRect">
@@ -9691,7 +9691,7 @@
         </p:nvSpPr>
         <p:spPr>
           <a:xfrm>
-            <a:off x="4941422" y="3092921"/>
+            <a:off x="3657906" y="2933530"/>
             <a:ext cx="900000" cy="289727"/>
           </a:xfrm>
           <a:prstGeom prst="roundRect">
@@ -9756,7 +9756,7 @@
         </p:nvSpPr>
         <p:spPr>
           <a:xfrm>
-            <a:off x="3945794" y="3092921"/>
+            <a:off x="2662278" y="2933530"/>
             <a:ext cx="900000" cy="289727"/>
           </a:xfrm>
           <a:prstGeom prst="roundRect">
@@ -9821,7 +9821,7 @@
         </p:nvSpPr>
         <p:spPr>
           <a:xfrm>
-            <a:off x="5937050" y="3092921"/>
+            <a:off x="4653534" y="2933530"/>
             <a:ext cx="900000" cy="289728"/>
           </a:xfrm>
           <a:prstGeom prst="roundRect">
@@ -9894,7 +9894,7 @@
         </p:nvSpPr>
         <p:spPr>
           <a:xfrm>
-            <a:off x="7672896" y="3092921"/>
+            <a:off x="6389380" y="2933530"/>
             <a:ext cx="633742" cy="289728"/>
           </a:xfrm>
           <a:prstGeom prst="roundRect">
@@ -9959,7 +9959,7 @@
         </p:nvSpPr>
         <p:spPr>
           <a:xfrm>
-            <a:off x="9712130" y="3798913"/>
+            <a:off x="8428614" y="3639522"/>
             <a:ext cx="1424261" cy="213954"/>
           </a:xfrm>
           <a:prstGeom prst="rect">
@@ -10008,7 +10008,7 @@
         </p:nvSpPr>
         <p:spPr>
           <a:xfrm>
-            <a:off x="3945794" y="5932909"/>
+            <a:off x="2662278" y="5773518"/>
             <a:ext cx="900000" cy="306000"/>
           </a:xfrm>
           <a:prstGeom prst="roundRect">
@@ -10078,7 +10078,7 @@
         </p:nvSpPr>
         <p:spPr>
           <a:xfrm>
-            <a:off x="9398361" y="5932909"/>
+            <a:off x="8114845" y="5773518"/>
             <a:ext cx="900000" cy="306000"/>
           </a:xfrm>
           <a:prstGeom prst="roundRect">
@@ -10148,7 +10148,7 @@
         </p:nvSpPr>
         <p:spPr>
           <a:xfrm>
-            <a:off x="3726687" y="4047771"/>
+            <a:off x="2443171" y="3888380"/>
             <a:ext cx="7435852" cy="1538707"/>
           </a:xfrm>
           <a:prstGeom prst="roundRect">
@@ -10210,7 +10210,7 @@
         </p:nvSpPr>
         <p:spPr>
           <a:xfrm>
-            <a:off x="3945794" y="4672519"/>
+            <a:off x="2662278" y="4513128"/>
             <a:ext cx="7048799" cy="774667"/>
           </a:xfrm>
           <a:prstGeom prst="roundRect">
@@ -10281,7 +10281,7 @@
         </p:nvSpPr>
         <p:spPr>
           <a:xfrm>
-            <a:off x="5842531" y="4323607"/>
+            <a:off x="4559015" y="4164216"/>
             <a:ext cx="2562946" cy="454604"/>
           </a:xfrm>
           <a:prstGeom prst="roundRect">
@@ -10343,7 +10343,7 @@
         </p:nvSpPr>
         <p:spPr>
           <a:xfrm>
-            <a:off x="8953090" y="4110765"/>
+            <a:off x="7669574" y="3951374"/>
             <a:ext cx="1716528" cy="129587"/>
           </a:xfrm>
           <a:prstGeom prst="rect">
@@ -10394,7 +10394,7 @@
         </p:nvSpPr>
         <p:spPr>
           <a:xfrm>
-            <a:off x="6714689" y="3798913"/>
+            <a:off x="5431173" y="3639522"/>
             <a:ext cx="1856244" cy="866663"/>
           </a:xfrm>
           <a:custGeom>
@@ -11313,7 +11313,7 @@
         </p:nvGrpSpPr>
         <p:grpSpPr>
           <a:xfrm>
-            <a:off x="7014455" y="4098876"/>
+            <a:off x="5730939" y="3939485"/>
             <a:ext cx="1222852" cy="506003"/>
             <a:chOff x="3671478" y="4032587"/>
             <a:chExt cx="1376425" cy="569551"/>
@@ -11488,7 +11488,7 @@
         </p:nvSpPr>
         <p:spPr>
           <a:xfrm>
-            <a:off x="4941422" y="4379315"/>
+            <a:off x="3657906" y="4219924"/>
             <a:ext cx="900000" cy="585791"/>
           </a:xfrm>
           <a:prstGeom prst="roundRect">
@@ -11552,7 +11552,7 @@
         </p:nvSpPr>
         <p:spPr>
           <a:xfrm>
-            <a:off x="3945794" y="4379315"/>
+            <a:off x="2662278" y="4219924"/>
             <a:ext cx="900000" cy="579432"/>
           </a:xfrm>
           <a:prstGeom prst="roundRect">
@@ -11616,7 +11616,7 @@
         </p:nvSpPr>
         <p:spPr>
           <a:xfrm>
-            <a:off x="8407761" y="4379315"/>
+            <a:off x="7124245" y="4219924"/>
             <a:ext cx="900001" cy="579432"/>
           </a:xfrm>
           <a:prstGeom prst="roundRect">
@@ -11680,7 +11680,7 @@
         </p:nvCxnSpPr>
         <p:spPr>
           <a:xfrm>
-            <a:off x="4959422" y="4282301"/>
+            <a:off x="3675906" y="4122910"/>
             <a:ext cx="864000" cy="0"/>
           </a:xfrm>
           <a:prstGeom prst="line">
@@ -11724,7 +11724,7 @@
         </p:nvCxnSpPr>
         <p:spPr>
           <a:xfrm>
-            <a:off x="10417015" y="4282301"/>
+            <a:off x="9133499" y="4122910"/>
             <a:ext cx="408820" cy="0"/>
           </a:xfrm>
           <a:prstGeom prst="line">
@@ -11779,7 +11779,7 @@
         </p:nvCxnSpPr>
         <p:spPr>
           <a:xfrm>
-            <a:off x="3963794" y="4282301"/>
+            <a:off x="2680278" y="4122910"/>
             <a:ext cx="864000" cy="0"/>
           </a:xfrm>
           <a:prstGeom prst="line">
@@ -11823,7 +11823,7 @@
         </p:nvCxnSpPr>
         <p:spPr>
           <a:xfrm>
-            <a:off x="8425762" y="4282301"/>
+            <a:off x="7142246" y="4122910"/>
             <a:ext cx="864000" cy="0"/>
           </a:xfrm>
           <a:prstGeom prst="line">
@@ -11867,7 +11867,7 @@
         </p:nvCxnSpPr>
         <p:spPr>
           <a:xfrm>
-            <a:off x="9421390" y="4282301"/>
+            <a:off x="8137874" y="4122910"/>
             <a:ext cx="864000" cy="0"/>
           </a:xfrm>
           <a:prstGeom prst="line">
@@ -11909,7 +11909,7 @@
         </p:nvSpPr>
         <p:spPr>
           <a:xfrm>
-            <a:off x="5937050" y="4260518"/>
+            <a:off x="4653534" y="4101127"/>
             <a:ext cx="900000" cy="337305"/>
           </a:xfrm>
           <a:prstGeom prst="roundRect">
@@ -11959,7 +11959,7 @@
                 <a:ea typeface="Source Sans Pro Light" charset="0"/>
                 <a:cs typeface="Source Sans Pro Light" charset="0"/>
               </a:rPr>
-              <a:t>Graphical Engine</a:t>
+              <a:t>Graphics Engine</a:t>
             </a:r>
           </a:p>
         </p:txBody>
@@ -11980,7 +11980,7 @@
         </p:nvCxnSpPr>
         <p:spPr>
           <a:xfrm>
-            <a:off x="5955050" y="4679961"/>
+            <a:off x="4671534" y="4520570"/>
             <a:ext cx="864000" cy="0"/>
           </a:xfrm>
           <a:prstGeom prst="line">
@@ -12022,7 +12022,7 @@
         </p:nvSpPr>
         <p:spPr>
           <a:xfrm>
-            <a:off x="4037846" y="4110765"/>
+            <a:off x="2754330" y="3951374"/>
             <a:ext cx="1716528" cy="129587"/>
           </a:xfrm>
           <a:prstGeom prst="rect">
@@ -12073,7 +12073,7 @@
         </p:nvSpPr>
         <p:spPr>
           <a:xfrm>
-            <a:off x="7014399" y="4442968"/>
+            <a:off x="5730883" y="4283577"/>
             <a:ext cx="1222908" cy="129587"/>
           </a:xfrm>
           <a:prstGeom prst="rect">
@@ -12126,7 +12126,7 @@
         </p:nvSpPr>
         <p:spPr>
           <a:xfrm>
-            <a:off x="4841046" y="4323607"/>
+            <a:off x="3557530" y="4164216"/>
             <a:ext cx="106929" cy="454604"/>
           </a:xfrm>
           <a:prstGeom prst="roundRect">
@@ -12188,7 +12188,7 @@
         </p:nvSpPr>
         <p:spPr>
           <a:xfrm>
-            <a:off x="9306871" y="4330905"/>
+            <a:off x="8023355" y="4171514"/>
             <a:ext cx="97997" cy="454604"/>
           </a:xfrm>
           <a:prstGeom prst="roundRect">
@@ -12250,7 +12250,7 @@
         </p:nvSpPr>
         <p:spPr>
           <a:xfrm>
-            <a:off x="10399015" y="4379313"/>
+            <a:off x="9115499" y="4219922"/>
             <a:ext cx="595578" cy="563803"/>
           </a:xfrm>
           <a:prstGeom prst="roundRect">
@@ -12310,7 +12310,7 @@
         </p:nvSpPr>
         <p:spPr>
           <a:xfrm>
-            <a:off x="9403390" y="4379315"/>
+            <a:off x="8119874" y="4219924"/>
             <a:ext cx="900000" cy="579432"/>
           </a:xfrm>
           <a:prstGeom prst="roundRect">
@@ -12370,7 +12370,7 @@
         </p:nvSpPr>
         <p:spPr>
           <a:xfrm>
-            <a:off x="8404586" y="4379315"/>
+            <a:off x="7121070" y="4219924"/>
             <a:ext cx="900001" cy="579432"/>
           </a:xfrm>
           <a:prstGeom prst="roundRect">
@@ -12432,7 +12432,7 @@
         </p:nvSpPr>
         <p:spPr>
           <a:xfrm>
-            <a:off x="10301240" y="4330905"/>
+            <a:off x="9017724" y="4171514"/>
             <a:ext cx="97776" cy="454604"/>
           </a:xfrm>
           <a:prstGeom prst="roundRect">

</xml_diff>